<commit_message>
Added Osasu to "Made with Kraken" section
</commit_message>
<xml_diff>
--- a/made-with-kraken.pptx
+++ b/made-with-kraken.pptx
@@ -16,6 +16,7 @@
     <p:sldId id="263" r:id="rId10"/>
     <p:sldId id="264" r:id="rId11"/>
     <p:sldId id="265" r:id="rId12"/>
+    <p:sldId id="266" r:id="rId13"/>
   </p:sldIdLst>
   <p:sldSz cx="1938338" cy="1087438"/>
   <p:notesSz cx="6858000" cy="9144000"/>
@@ -298,7 +299,7 @@
           <a:p>
             <a:fld id="{34C6AA67-E7EC-BD42-94FC-5443D25F9C23}" type="datetimeFigureOut">
               <a:rPr lang="en-US" smtClean="0"/>
-              <a:t>12/2/13</a:t>
+              <a:t>12/3/13</a:t>
             </a:fld>
             <a:endParaRPr lang="en-US"/>
           </a:p>
@@ -468,7 +469,7 @@
           <a:p>
             <a:fld id="{34C6AA67-E7EC-BD42-94FC-5443D25F9C23}" type="datetimeFigureOut">
               <a:rPr lang="en-US" smtClean="0"/>
-              <a:t>12/2/13</a:t>
+              <a:t>12/3/13</a:t>
             </a:fld>
             <a:endParaRPr lang="en-US"/>
           </a:p>
@@ -648,7 +649,7 @@
           <a:p>
             <a:fld id="{34C6AA67-E7EC-BD42-94FC-5443D25F9C23}" type="datetimeFigureOut">
               <a:rPr lang="en-US" smtClean="0"/>
-              <a:t>12/2/13</a:t>
+              <a:t>12/3/13</a:t>
             </a:fld>
             <a:endParaRPr lang="en-US"/>
           </a:p>
@@ -1244,7 +1245,7 @@
                 <a:latin typeface="Calibri"/>
               </a:rPr>
               <a:pPr/>
-              <a:t>12/2/13</a:t>
+              <a:t>12/3/13</a:t>
             </a:fld>
             <a:endParaRPr lang="en-US">
               <a:solidFill>
@@ -1451,7 +1452,7 @@
                 <a:latin typeface="Calibri"/>
               </a:rPr>
               <a:pPr/>
-              <a:t>12/2/13</a:t>
+              <a:t>12/3/13</a:t>
             </a:fld>
             <a:endParaRPr lang="en-US">
               <a:solidFill>
@@ -1734,7 +1735,7 @@
                 <a:latin typeface="Calibri"/>
               </a:rPr>
               <a:pPr/>
-              <a:t>12/2/13</a:t>
+              <a:t>12/3/13</a:t>
             </a:fld>
             <a:endParaRPr lang="en-US">
               <a:solidFill>
@@ -2059,7 +2060,7 @@
                 <a:latin typeface="Calibri"/>
               </a:rPr>
               <a:pPr/>
-              <a:t>12/2/13</a:t>
+              <a:t>12/3/13</a:t>
             </a:fld>
             <a:endParaRPr lang="en-US">
               <a:solidFill>
@@ -2523,7 +2524,7 @@
                 <a:latin typeface="Calibri"/>
               </a:rPr>
               <a:pPr/>
-              <a:t>12/2/13</a:t>
+              <a:t>12/3/13</a:t>
             </a:fld>
             <a:endParaRPr lang="en-US">
               <a:solidFill>
@@ -2678,7 +2679,7 @@
                 <a:latin typeface="Calibri"/>
               </a:rPr>
               <a:pPr/>
-              <a:t>12/2/13</a:t>
+              <a:t>12/3/13</a:t>
             </a:fld>
             <a:endParaRPr lang="en-US">
               <a:solidFill>
@@ -2810,7 +2811,7 @@
                 <a:latin typeface="Calibri"/>
               </a:rPr>
               <a:pPr/>
-              <a:t>12/2/13</a:t>
+              <a:t>12/3/13</a:t>
             </a:fld>
             <a:endParaRPr lang="en-US">
               <a:solidFill>
@@ -3009,7 +3010,7 @@
           <a:p>
             <a:fld id="{34C6AA67-E7EC-BD42-94FC-5443D25F9C23}" type="datetimeFigureOut">
               <a:rPr lang="en-US" smtClean="0"/>
-              <a:t>12/2/13</a:t>
+              <a:t>12/3/13</a:t>
             </a:fld>
             <a:endParaRPr lang="en-US"/>
           </a:p>
@@ -3294,7 +3295,7 @@
                 <a:latin typeface="Calibri"/>
               </a:rPr>
               <a:pPr/>
-              <a:t>12/2/13</a:t>
+              <a:t>12/3/13</a:t>
             </a:fld>
             <a:endParaRPr lang="en-US">
               <a:solidFill>
@@ -3584,7 +3585,7 @@
                 <a:latin typeface="Calibri"/>
               </a:rPr>
               <a:pPr/>
-              <a:t>12/2/13</a:t>
+              <a:t>12/3/13</a:t>
             </a:fld>
             <a:endParaRPr lang="en-US">
               <a:solidFill>
@@ -3791,7 +3792,7 @@
                 <a:latin typeface="Calibri"/>
               </a:rPr>
               <a:pPr/>
-              <a:t>12/2/13</a:t>
+              <a:t>12/3/13</a:t>
             </a:fld>
             <a:endParaRPr lang="en-US">
               <a:solidFill>
@@ -4008,7 +4009,7 @@
                 <a:latin typeface="Calibri"/>
               </a:rPr>
               <a:pPr/>
-              <a:t>12/2/13</a:t>
+              <a:t>12/3/13</a:t>
             </a:fld>
             <a:endParaRPr lang="en-US">
               <a:solidFill>
@@ -4287,7 +4288,7 @@
                 <a:latin typeface="Calibri"/>
               </a:rPr>
               <a:pPr/>
-              <a:t>12/2/13</a:t>
+              <a:t>12/3/13</a:t>
             </a:fld>
             <a:endParaRPr lang="en-US">
               <a:solidFill>
@@ -4494,7 +4495,7 @@
                 <a:latin typeface="Calibri"/>
               </a:rPr>
               <a:pPr/>
-              <a:t>12/2/13</a:t>
+              <a:t>12/3/13</a:t>
             </a:fld>
             <a:endParaRPr lang="en-US">
               <a:solidFill>
@@ -4777,7 +4778,7 @@
                 <a:latin typeface="Calibri"/>
               </a:rPr>
               <a:pPr/>
-              <a:t>12/2/13</a:t>
+              <a:t>12/3/13</a:t>
             </a:fld>
             <a:endParaRPr lang="en-US">
               <a:solidFill>
@@ -5102,7 +5103,7 @@
                 <a:latin typeface="Calibri"/>
               </a:rPr>
               <a:pPr/>
-              <a:t>12/2/13</a:t>
+              <a:t>12/3/13</a:t>
             </a:fld>
             <a:endParaRPr lang="en-US">
               <a:solidFill>
@@ -5561,7 +5562,7 @@
                 <a:latin typeface="Calibri"/>
               </a:rPr>
               <a:pPr/>
-              <a:t>12/2/13</a:t>
+              <a:t>12/3/13</a:t>
             </a:fld>
             <a:endParaRPr lang="en-US">
               <a:solidFill>
@@ -5716,7 +5717,7 @@
                 <a:latin typeface="Calibri"/>
               </a:rPr>
               <a:pPr/>
-              <a:t>12/2/13</a:t>
+              <a:t>12/3/13</a:t>
             </a:fld>
             <a:endParaRPr lang="en-US">
               <a:solidFill>
@@ -6001,7 +6002,7 @@
           <a:p>
             <a:fld id="{34C6AA67-E7EC-BD42-94FC-5443D25F9C23}" type="datetimeFigureOut">
               <a:rPr lang="en-US" smtClean="0"/>
-              <a:t>12/2/13</a:t>
+              <a:t>12/3/13</a:t>
             </a:fld>
             <a:endParaRPr lang="en-US"/>
           </a:p>
@@ -6104,7 +6105,7 @@
                 <a:latin typeface="Calibri"/>
               </a:rPr>
               <a:pPr/>
-              <a:t>12/2/13</a:t>
+              <a:t>12/3/13</a:t>
             </a:fld>
             <a:endParaRPr lang="en-US">
               <a:solidFill>
@@ -6418,7 +6419,7 @@
                 <a:latin typeface="Calibri"/>
               </a:rPr>
               <a:pPr/>
-              <a:t>12/2/13</a:t>
+              <a:t>12/3/13</a:t>
             </a:fld>
             <a:endParaRPr lang="en-US">
               <a:solidFill>
@@ -6708,7 +6709,7 @@
                 <a:latin typeface="Calibri"/>
               </a:rPr>
               <a:pPr/>
-              <a:t>12/2/13</a:t>
+              <a:t>12/3/13</a:t>
             </a:fld>
             <a:endParaRPr lang="en-US">
               <a:solidFill>
@@ -6915,7 +6916,7 @@
                 <a:latin typeface="Calibri"/>
               </a:rPr>
               <a:pPr/>
-              <a:t>12/2/13</a:t>
+              <a:t>12/3/13</a:t>
             </a:fld>
             <a:endParaRPr lang="en-US">
               <a:solidFill>
@@ -7132,7 +7133,7 @@
                 <a:latin typeface="Calibri"/>
               </a:rPr>
               <a:pPr/>
-              <a:t>12/2/13</a:t>
+              <a:t>12/3/13</a:t>
             </a:fld>
             <a:endParaRPr lang="en-US">
               <a:solidFill>
@@ -7762,7 +7763,7 @@
                 <a:latin typeface="Calibri"/>
               </a:rPr>
               <a:pPr/>
-              <a:t>12/2/13</a:t>
+              <a:t>12/3/13</a:t>
             </a:fld>
             <a:endParaRPr lang="en-US">
               <a:solidFill>
@@ -7969,7 +7970,7 @@
                 <a:latin typeface="Calibri"/>
               </a:rPr>
               <a:pPr/>
-              <a:t>12/2/13</a:t>
+              <a:t>12/3/13</a:t>
             </a:fld>
             <a:endParaRPr lang="en-US">
               <a:solidFill>
@@ -8252,7 +8253,7 @@
                 <a:latin typeface="Calibri"/>
               </a:rPr>
               <a:pPr/>
-              <a:t>12/2/13</a:t>
+              <a:t>12/3/13</a:t>
             </a:fld>
             <a:endParaRPr lang="en-US">
               <a:solidFill>
@@ -8577,7 +8578,7 @@
                 <a:latin typeface="Calibri"/>
               </a:rPr>
               <a:pPr/>
-              <a:t>12/2/13</a:t>
+              <a:t>12/3/13</a:t>
             </a:fld>
             <a:endParaRPr lang="en-US">
               <a:solidFill>
@@ -8894,7 +8895,7 @@
           <a:p>
             <a:fld id="{34C6AA67-E7EC-BD42-94FC-5443D25F9C23}" type="datetimeFigureOut">
               <a:rPr lang="en-US" smtClean="0"/>
-              <a:t>12/2/13</a:t>
+              <a:t>12/3/13</a:t>
             </a:fld>
             <a:endParaRPr lang="en-US"/>
           </a:p>
@@ -9324,7 +9325,7 @@
                 <a:latin typeface="Calibri"/>
               </a:rPr>
               <a:pPr/>
-              <a:t>12/2/13</a:t>
+              <a:t>12/3/13</a:t>
             </a:fld>
             <a:endParaRPr lang="en-US">
               <a:solidFill>
@@ -9479,7 +9480,7 @@
                 <a:latin typeface="Calibri"/>
               </a:rPr>
               <a:pPr/>
-              <a:t>12/2/13</a:t>
+              <a:t>12/3/13</a:t>
             </a:fld>
             <a:endParaRPr lang="en-US">
               <a:solidFill>
@@ -9621,7 +9622,7 @@
                 <a:latin typeface="Calibri"/>
               </a:rPr>
               <a:pPr/>
-              <a:t>12/2/13</a:t>
+              <a:t>12/3/13</a:t>
             </a:fld>
             <a:endParaRPr lang="en-US">
               <a:solidFill>
@@ -9935,7 +9936,7 @@
                 <a:latin typeface="Calibri"/>
               </a:rPr>
               <a:pPr/>
-              <a:t>12/2/13</a:t>
+              <a:t>12/3/13</a:t>
             </a:fld>
             <a:endParaRPr lang="en-US">
               <a:solidFill>
@@ -10225,7 +10226,7 @@
                 <a:latin typeface="Calibri"/>
               </a:rPr>
               <a:pPr/>
-              <a:t>12/2/13</a:t>
+              <a:t>12/3/13</a:t>
             </a:fld>
             <a:endParaRPr lang="en-US">
               <a:solidFill>
@@ -10432,7 +10433,7 @@
                 <a:latin typeface="Calibri"/>
               </a:rPr>
               <a:pPr/>
-              <a:t>12/2/13</a:t>
+              <a:t>12/3/13</a:t>
             </a:fld>
             <a:endParaRPr lang="en-US">
               <a:solidFill>
@@ -10649,7 +10650,7 @@
                 <a:latin typeface="Calibri"/>
               </a:rPr>
               <a:pPr/>
-              <a:t>12/2/13</a:t>
+              <a:t>12/3/13</a:t>
             </a:fld>
             <a:endParaRPr lang="en-US">
               <a:solidFill>
@@ -11451,7 +11452,7 @@
           <a:p>
             <a:fld id="{34C6AA67-E7EC-BD42-94FC-5443D25F9C23}" type="datetimeFigureOut">
               <a:rPr lang="en-US" smtClean="0"/>
-              <a:t>12/2/13</a:t>
+              <a:t>12/3/13</a:t>
             </a:fld>
             <a:endParaRPr lang="en-US"/>
           </a:p>
@@ -11569,7 +11570,7 @@
           <a:p>
             <a:fld id="{34C6AA67-E7EC-BD42-94FC-5443D25F9C23}" type="datetimeFigureOut">
               <a:rPr lang="en-US" smtClean="0"/>
-              <a:t>12/2/13</a:t>
+              <a:t>12/3/13</a:t>
             </a:fld>
             <a:endParaRPr lang="en-US"/>
           </a:p>
@@ -11674,7 +11675,7 @@
           <a:p>
             <a:fld id="{34C6AA67-E7EC-BD42-94FC-5443D25F9C23}" type="datetimeFigureOut">
               <a:rPr lang="en-US" smtClean="0"/>
-              <a:t>12/2/13</a:t>
+              <a:t>12/3/13</a:t>
             </a:fld>
             <a:endParaRPr lang="en-US"/>
           </a:p>
@@ -11951,7 +11952,7 @@
           <a:p>
             <a:fld id="{34C6AA67-E7EC-BD42-94FC-5443D25F9C23}" type="datetimeFigureOut">
               <a:rPr lang="en-US" smtClean="0"/>
-              <a:t>12/2/13</a:t>
+              <a:t>12/3/13</a:t>
             </a:fld>
             <a:endParaRPr lang="en-US"/>
           </a:p>
@@ -12204,7 +12205,7 @@
           <a:p>
             <a:fld id="{34C6AA67-E7EC-BD42-94FC-5443D25F9C23}" type="datetimeFigureOut">
               <a:rPr lang="en-US" smtClean="0"/>
-              <a:t>12/2/13</a:t>
+              <a:t>12/3/13</a:t>
             </a:fld>
             <a:endParaRPr lang="en-US"/>
           </a:p>
@@ -12417,7 +12418,7 @@
           <a:p>
             <a:fld id="{34C6AA67-E7EC-BD42-94FC-5443D25F9C23}" type="datetimeFigureOut">
               <a:rPr lang="en-US" smtClean="0"/>
-              <a:t>12/2/13</a:t>
+              <a:t>12/3/13</a:t>
             </a:fld>
             <a:endParaRPr lang="en-US"/>
           </a:p>
@@ -12950,7 +12951,7 @@
                 <a:latin typeface="Calibri"/>
               </a:rPr>
               <a:pPr defTabSz="86263"/>
-              <a:t>12/2/13</a:t>
+              <a:t>12/3/13</a:t>
             </a:fld>
             <a:endParaRPr lang="en-US">
               <a:solidFill>
@@ -13499,7 +13500,7 @@
                 <a:latin typeface="Calibri"/>
               </a:rPr>
               <a:pPr/>
-              <a:t>12/2/13</a:t>
+              <a:t>12/3/13</a:t>
             </a:fld>
             <a:endParaRPr lang="en-US">
               <a:solidFill>
@@ -14057,7 +14058,7 @@
                 <a:latin typeface="Calibri"/>
               </a:rPr>
               <a:pPr/>
-              <a:t>12/2/13</a:t>
+              <a:t>12/3/13</a:t>
             </a:fld>
             <a:endParaRPr lang="en-US">
               <a:solidFill>
@@ -15496,6 +15497,124 @@
     <p:extLst>
       <p:ext uri="{BB962C8B-B14F-4D97-AF65-F5344CB8AC3E}">
         <p14:creationId xmlns:p14="http://schemas.microsoft.com/office/powerpoint/2010/main" val="1059043742"/>
+      </p:ext>
+    </p:extLst>
+  </p:cSld>
+  <p:clrMapOvr>
+    <a:masterClrMapping/>
+  </p:clrMapOvr>
+  <p:transition xmlns:p14="http://schemas.microsoft.com/office/powerpoint/2010/main">
+    <p:fade/>
+  </p:transition>
+  <p:timing>
+    <p:tnLst>
+      <p:par>
+        <p:cTn xmlns:p14="http://schemas.microsoft.com/office/powerpoint/2010/main" id="1" dur="indefinite" restart="never" nodeType="tmRoot"/>
+      </p:par>
+    </p:tnLst>
+  </p:timing>
+</p:sld>
+</file>
+
+<file path=ppt/slides/slide9.xml><?xml version="1.0" encoding="utf-8"?>
+<p:sld xmlns:a="http://schemas.openxmlformats.org/drawingml/2006/main" xmlns:r="http://schemas.openxmlformats.org/officeDocument/2006/relationships" xmlns:p="http://schemas.openxmlformats.org/presentationml/2006/main">
+  <p:cSld>
+    <p:spTree>
+      <p:nvGrpSpPr>
+        <p:cNvPr id="1" name=""/>
+        <p:cNvGrpSpPr/>
+        <p:nvPr/>
+      </p:nvGrpSpPr>
+      <p:grpSpPr>
+        <a:xfrm>
+          <a:off x="0" y="0"/>
+          <a:ext cx="0" cy="0"/>
+          <a:chOff x="0" y="0"/>
+          <a:chExt cx="0" cy="0"/>
+        </a:xfrm>
+      </p:grpSpPr>
+      <p:sp>
+        <p:nvSpPr>
+          <p:cNvPr id="11" name="Rectangle 10"/>
+          <p:cNvSpPr/>
+          <p:nvPr/>
+        </p:nvSpPr>
+        <p:spPr>
+          <a:xfrm>
+            <a:off x="0" y="0"/>
+            <a:ext cx="1938338" cy="1087438"/>
+          </a:xfrm>
+          <a:prstGeom prst="rect">
+            <a:avLst/>
+          </a:prstGeom>
+          <a:noFill/>
+          <a:ln w="12700" cmpd="sng">
+            <a:solidFill>
+              <a:schemeClr val="tx1">
+                <a:lumMod val="65000"/>
+                <a:lumOff val="35000"/>
+              </a:schemeClr>
+            </a:solidFill>
+          </a:ln>
+          <a:effectLst/>
+        </p:spPr>
+        <p:style>
+          <a:lnRef idx="1">
+            <a:schemeClr val="accent1"/>
+          </a:lnRef>
+          <a:fillRef idx="3">
+            <a:schemeClr val="accent1"/>
+          </a:fillRef>
+          <a:effectRef idx="2">
+            <a:schemeClr val="accent1"/>
+          </a:effectRef>
+          <a:fontRef idx="minor">
+            <a:schemeClr val="lt1"/>
+          </a:fontRef>
+        </p:style>
+        <p:txBody>
+          <a:bodyPr lIns="19330" tIns="9663" rIns="19330" bIns="9663" rtlCol="0" anchor="ctr"/>
+          <a:lstStyle/>
+          <a:p>
+            <a:pPr algn="ctr"/>
+            <a:endParaRPr lang="en-US"/>
+          </a:p>
+        </p:txBody>
+      </p:sp>
+      <p:pic>
+        <p:nvPicPr>
+          <p:cNvPr id="3" name="Picture 2" descr="sasu.png"/>
+          <p:cNvPicPr>
+            <a:picLocks noChangeAspect="1"/>
+          </p:cNvPicPr>
+          <p:nvPr/>
+        </p:nvPicPr>
+        <p:blipFill>
+          <a:blip r:embed="rId2">
+            <a:extLst>
+              <a:ext uri="{28A0092B-C50C-407E-A947-70E740481C1C}">
+                <a14:useLocalDpi xmlns:a14="http://schemas.microsoft.com/office/drawing/2010/main" val="0"/>
+              </a:ext>
+            </a:extLst>
+          </a:blip>
+          <a:stretch>
+            <a:fillRect/>
+          </a:stretch>
+        </p:blipFill>
+        <p:spPr>
+          <a:xfrm>
+            <a:off x="166688" y="208922"/>
+            <a:ext cx="1604962" cy="666514"/>
+          </a:xfrm>
+          <a:prstGeom prst="rect">
+            <a:avLst/>
+          </a:prstGeom>
+        </p:spPr>
+      </p:pic>
+    </p:spTree>
+    <p:extLst>
+      <p:ext uri="{BB962C8B-B14F-4D97-AF65-F5344CB8AC3E}">
+        <p14:creationId xmlns:p14="http://schemas.microsoft.com/office/powerpoint/2010/main" val="3594110498"/>
       </p:ext>
     </p:extLst>
   </p:cSld>

</xml_diff>

<commit_message>
Added shift it to built with kraken section
</commit_message>
<xml_diff>
--- a/made-with-kraken.pptx
+++ b/made-with-kraken.pptx
@@ -17,6 +17,7 @@
     <p:sldId id="264" r:id="rId11"/>
     <p:sldId id="265" r:id="rId12"/>
     <p:sldId id="266" r:id="rId13"/>
+    <p:sldId id="267" r:id="rId14"/>
   </p:sldIdLst>
   <p:sldSz cx="1938338" cy="1087438"/>
   <p:notesSz cx="6858000" cy="9144000"/>
@@ -299,7 +300,7 @@
           <a:p>
             <a:fld id="{34C6AA67-E7EC-BD42-94FC-5443D25F9C23}" type="datetimeFigureOut">
               <a:rPr lang="en-US" smtClean="0"/>
-              <a:t>12/3/13</a:t>
+              <a:t>12/9/13</a:t>
             </a:fld>
             <a:endParaRPr lang="en-US"/>
           </a:p>
@@ -469,7 +470,7 @@
           <a:p>
             <a:fld id="{34C6AA67-E7EC-BD42-94FC-5443D25F9C23}" type="datetimeFigureOut">
               <a:rPr lang="en-US" smtClean="0"/>
-              <a:t>12/3/13</a:t>
+              <a:t>12/9/13</a:t>
             </a:fld>
             <a:endParaRPr lang="en-US"/>
           </a:p>
@@ -649,7 +650,7 @@
           <a:p>
             <a:fld id="{34C6AA67-E7EC-BD42-94FC-5443D25F9C23}" type="datetimeFigureOut">
               <a:rPr lang="en-US" smtClean="0"/>
-              <a:t>12/3/13</a:t>
+              <a:t>12/9/13</a:t>
             </a:fld>
             <a:endParaRPr lang="en-US"/>
           </a:p>
@@ -1245,7 +1246,7 @@
                 <a:latin typeface="Calibri"/>
               </a:rPr>
               <a:pPr/>
-              <a:t>12/3/13</a:t>
+              <a:t>12/9/13</a:t>
             </a:fld>
             <a:endParaRPr lang="en-US">
               <a:solidFill>
@@ -1452,7 +1453,7 @@
                 <a:latin typeface="Calibri"/>
               </a:rPr>
               <a:pPr/>
-              <a:t>12/3/13</a:t>
+              <a:t>12/9/13</a:t>
             </a:fld>
             <a:endParaRPr lang="en-US">
               <a:solidFill>
@@ -1735,7 +1736,7 @@
                 <a:latin typeface="Calibri"/>
               </a:rPr>
               <a:pPr/>
-              <a:t>12/3/13</a:t>
+              <a:t>12/9/13</a:t>
             </a:fld>
             <a:endParaRPr lang="en-US">
               <a:solidFill>
@@ -2060,7 +2061,7 @@
                 <a:latin typeface="Calibri"/>
               </a:rPr>
               <a:pPr/>
-              <a:t>12/3/13</a:t>
+              <a:t>12/9/13</a:t>
             </a:fld>
             <a:endParaRPr lang="en-US">
               <a:solidFill>
@@ -2524,7 +2525,7 @@
                 <a:latin typeface="Calibri"/>
               </a:rPr>
               <a:pPr/>
-              <a:t>12/3/13</a:t>
+              <a:t>12/9/13</a:t>
             </a:fld>
             <a:endParaRPr lang="en-US">
               <a:solidFill>
@@ -2679,7 +2680,7 @@
                 <a:latin typeface="Calibri"/>
               </a:rPr>
               <a:pPr/>
-              <a:t>12/3/13</a:t>
+              <a:t>12/9/13</a:t>
             </a:fld>
             <a:endParaRPr lang="en-US">
               <a:solidFill>
@@ -2811,7 +2812,7 @@
                 <a:latin typeface="Calibri"/>
               </a:rPr>
               <a:pPr/>
-              <a:t>12/3/13</a:t>
+              <a:t>12/9/13</a:t>
             </a:fld>
             <a:endParaRPr lang="en-US">
               <a:solidFill>
@@ -3010,7 +3011,7 @@
           <a:p>
             <a:fld id="{34C6AA67-E7EC-BD42-94FC-5443D25F9C23}" type="datetimeFigureOut">
               <a:rPr lang="en-US" smtClean="0"/>
-              <a:t>12/3/13</a:t>
+              <a:t>12/9/13</a:t>
             </a:fld>
             <a:endParaRPr lang="en-US"/>
           </a:p>
@@ -3295,7 +3296,7 @@
                 <a:latin typeface="Calibri"/>
               </a:rPr>
               <a:pPr/>
-              <a:t>12/3/13</a:t>
+              <a:t>12/9/13</a:t>
             </a:fld>
             <a:endParaRPr lang="en-US">
               <a:solidFill>
@@ -3585,7 +3586,7 @@
                 <a:latin typeface="Calibri"/>
               </a:rPr>
               <a:pPr/>
-              <a:t>12/3/13</a:t>
+              <a:t>12/9/13</a:t>
             </a:fld>
             <a:endParaRPr lang="en-US">
               <a:solidFill>
@@ -3792,7 +3793,7 @@
                 <a:latin typeface="Calibri"/>
               </a:rPr>
               <a:pPr/>
-              <a:t>12/3/13</a:t>
+              <a:t>12/9/13</a:t>
             </a:fld>
             <a:endParaRPr lang="en-US">
               <a:solidFill>
@@ -4009,7 +4010,7 @@
                 <a:latin typeface="Calibri"/>
               </a:rPr>
               <a:pPr/>
-              <a:t>12/3/13</a:t>
+              <a:t>12/9/13</a:t>
             </a:fld>
             <a:endParaRPr lang="en-US">
               <a:solidFill>
@@ -4288,7 +4289,7 @@
                 <a:latin typeface="Calibri"/>
               </a:rPr>
               <a:pPr/>
-              <a:t>12/3/13</a:t>
+              <a:t>12/9/13</a:t>
             </a:fld>
             <a:endParaRPr lang="en-US">
               <a:solidFill>
@@ -4495,7 +4496,7 @@
                 <a:latin typeface="Calibri"/>
               </a:rPr>
               <a:pPr/>
-              <a:t>12/3/13</a:t>
+              <a:t>12/9/13</a:t>
             </a:fld>
             <a:endParaRPr lang="en-US">
               <a:solidFill>
@@ -4778,7 +4779,7 @@
                 <a:latin typeface="Calibri"/>
               </a:rPr>
               <a:pPr/>
-              <a:t>12/3/13</a:t>
+              <a:t>12/9/13</a:t>
             </a:fld>
             <a:endParaRPr lang="en-US">
               <a:solidFill>
@@ -5103,7 +5104,7 @@
                 <a:latin typeface="Calibri"/>
               </a:rPr>
               <a:pPr/>
-              <a:t>12/3/13</a:t>
+              <a:t>12/9/13</a:t>
             </a:fld>
             <a:endParaRPr lang="en-US">
               <a:solidFill>
@@ -5562,7 +5563,7 @@
                 <a:latin typeface="Calibri"/>
               </a:rPr>
               <a:pPr/>
-              <a:t>12/3/13</a:t>
+              <a:t>12/9/13</a:t>
             </a:fld>
             <a:endParaRPr lang="en-US">
               <a:solidFill>
@@ -5717,7 +5718,7 @@
                 <a:latin typeface="Calibri"/>
               </a:rPr>
               <a:pPr/>
-              <a:t>12/3/13</a:t>
+              <a:t>12/9/13</a:t>
             </a:fld>
             <a:endParaRPr lang="en-US">
               <a:solidFill>
@@ -6002,7 +6003,7 @@
           <a:p>
             <a:fld id="{34C6AA67-E7EC-BD42-94FC-5443D25F9C23}" type="datetimeFigureOut">
               <a:rPr lang="en-US" smtClean="0"/>
-              <a:t>12/3/13</a:t>
+              <a:t>12/9/13</a:t>
             </a:fld>
             <a:endParaRPr lang="en-US"/>
           </a:p>
@@ -6105,7 +6106,7 @@
                 <a:latin typeface="Calibri"/>
               </a:rPr>
               <a:pPr/>
-              <a:t>12/3/13</a:t>
+              <a:t>12/9/13</a:t>
             </a:fld>
             <a:endParaRPr lang="en-US">
               <a:solidFill>
@@ -6419,7 +6420,7 @@
                 <a:latin typeface="Calibri"/>
               </a:rPr>
               <a:pPr/>
-              <a:t>12/3/13</a:t>
+              <a:t>12/9/13</a:t>
             </a:fld>
             <a:endParaRPr lang="en-US">
               <a:solidFill>
@@ -6709,7 +6710,7 @@
                 <a:latin typeface="Calibri"/>
               </a:rPr>
               <a:pPr/>
-              <a:t>12/3/13</a:t>
+              <a:t>12/9/13</a:t>
             </a:fld>
             <a:endParaRPr lang="en-US">
               <a:solidFill>
@@ -6916,7 +6917,7 @@
                 <a:latin typeface="Calibri"/>
               </a:rPr>
               <a:pPr/>
-              <a:t>12/3/13</a:t>
+              <a:t>12/9/13</a:t>
             </a:fld>
             <a:endParaRPr lang="en-US">
               <a:solidFill>
@@ -7133,7 +7134,7 @@
                 <a:latin typeface="Calibri"/>
               </a:rPr>
               <a:pPr/>
-              <a:t>12/3/13</a:t>
+              <a:t>12/9/13</a:t>
             </a:fld>
             <a:endParaRPr lang="en-US">
               <a:solidFill>
@@ -7763,7 +7764,7 @@
                 <a:latin typeface="Calibri"/>
               </a:rPr>
               <a:pPr/>
-              <a:t>12/3/13</a:t>
+              <a:t>12/9/13</a:t>
             </a:fld>
             <a:endParaRPr lang="en-US">
               <a:solidFill>
@@ -7970,7 +7971,7 @@
                 <a:latin typeface="Calibri"/>
               </a:rPr>
               <a:pPr/>
-              <a:t>12/3/13</a:t>
+              <a:t>12/9/13</a:t>
             </a:fld>
             <a:endParaRPr lang="en-US">
               <a:solidFill>
@@ -8253,7 +8254,7 @@
                 <a:latin typeface="Calibri"/>
               </a:rPr>
               <a:pPr/>
-              <a:t>12/3/13</a:t>
+              <a:t>12/9/13</a:t>
             </a:fld>
             <a:endParaRPr lang="en-US">
               <a:solidFill>
@@ -8578,7 +8579,7 @@
                 <a:latin typeface="Calibri"/>
               </a:rPr>
               <a:pPr/>
-              <a:t>12/3/13</a:t>
+              <a:t>12/9/13</a:t>
             </a:fld>
             <a:endParaRPr lang="en-US">
               <a:solidFill>
@@ -8895,7 +8896,7 @@
           <a:p>
             <a:fld id="{34C6AA67-E7EC-BD42-94FC-5443D25F9C23}" type="datetimeFigureOut">
               <a:rPr lang="en-US" smtClean="0"/>
-              <a:t>12/3/13</a:t>
+              <a:t>12/9/13</a:t>
             </a:fld>
             <a:endParaRPr lang="en-US"/>
           </a:p>
@@ -9325,7 +9326,7 @@
                 <a:latin typeface="Calibri"/>
               </a:rPr>
               <a:pPr/>
-              <a:t>12/3/13</a:t>
+              <a:t>12/9/13</a:t>
             </a:fld>
             <a:endParaRPr lang="en-US">
               <a:solidFill>
@@ -9480,7 +9481,7 @@
                 <a:latin typeface="Calibri"/>
               </a:rPr>
               <a:pPr/>
-              <a:t>12/3/13</a:t>
+              <a:t>12/9/13</a:t>
             </a:fld>
             <a:endParaRPr lang="en-US">
               <a:solidFill>
@@ -9622,7 +9623,7 @@
                 <a:latin typeface="Calibri"/>
               </a:rPr>
               <a:pPr/>
-              <a:t>12/3/13</a:t>
+              <a:t>12/9/13</a:t>
             </a:fld>
             <a:endParaRPr lang="en-US">
               <a:solidFill>
@@ -9936,7 +9937,7 @@
                 <a:latin typeface="Calibri"/>
               </a:rPr>
               <a:pPr/>
-              <a:t>12/3/13</a:t>
+              <a:t>12/9/13</a:t>
             </a:fld>
             <a:endParaRPr lang="en-US">
               <a:solidFill>
@@ -10226,7 +10227,7 @@
                 <a:latin typeface="Calibri"/>
               </a:rPr>
               <a:pPr/>
-              <a:t>12/3/13</a:t>
+              <a:t>12/9/13</a:t>
             </a:fld>
             <a:endParaRPr lang="en-US">
               <a:solidFill>
@@ -10433,7 +10434,7 @@
                 <a:latin typeface="Calibri"/>
               </a:rPr>
               <a:pPr/>
-              <a:t>12/3/13</a:t>
+              <a:t>12/9/13</a:t>
             </a:fld>
             <a:endParaRPr lang="en-US">
               <a:solidFill>
@@ -10650,7 +10651,7 @@
                 <a:latin typeface="Calibri"/>
               </a:rPr>
               <a:pPr/>
-              <a:t>12/3/13</a:t>
+              <a:t>12/9/13</a:t>
             </a:fld>
             <a:endParaRPr lang="en-US">
               <a:solidFill>
@@ -11452,7 +11453,7 @@
           <a:p>
             <a:fld id="{34C6AA67-E7EC-BD42-94FC-5443D25F9C23}" type="datetimeFigureOut">
               <a:rPr lang="en-US" smtClean="0"/>
-              <a:t>12/3/13</a:t>
+              <a:t>12/9/13</a:t>
             </a:fld>
             <a:endParaRPr lang="en-US"/>
           </a:p>
@@ -11570,7 +11571,7 @@
           <a:p>
             <a:fld id="{34C6AA67-E7EC-BD42-94FC-5443D25F9C23}" type="datetimeFigureOut">
               <a:rPr lang="en-US" smtClean="0"/>
-              <a:t>12/3/13</a:t>
+              <a:t>12/9/13</a:t>
             </a:fld>
             <a:endParaRPr lang="en-US"/>
           </a:p>
@@ -11675,7 +11676,7 @@
           <a:p>
             <a:fld id="{34C6AA67-E7EC-BD42-94FC-5443D25F9C23}" type="datetimeFigureOut">
               <a:rPr lang="en-US" smtClean="0"/>
-              <a:t>12/3/13</a:t>
+              <a:t>12/9/13</a:t>
             </a:fld>
             <a:endParaRPr lang="en-US"/>
           </a:p>
@@ -11952,7 +11953,7 @@
           <a:p>
             <a:fld id="{34C6AA67-E7EC-BD42-94FC-5443D25F9C23}" type="datetimeFigureOut">
               <a:rPr lang="en-US" smtClean="0"/>
-              <a:t>12/3/13</a:t>
+              <a:t>12/9/13</a:t>
             </a:fld>
             <a:endParaRPr lang="en-US"/>
           </a:p>
@@ -12205,7 +12206,7 @@
           <a:p>
             <a:fld id="{34C6AA67-E7EC-BD42-94FC-5443D25F9C23}" type="datetimeFigureOut">
               <a:rPr lang="en-US" smtClean="0"/>
-              <a:t>12/3/13</a:t>
+              <a:t>12/9/13</a:t>
             </a:fld>
             <a:endParaRPr lang="en-US"/>
           </a:p>
@@ -12418,7 +12419,7 @@
           <a:p>
             <a:fld id="{34C6AA67-E7EC-BD42-94FC-5443D25F9C23}" type="datetimeFigureOut">
               <a:rPr lang="en-US" smtClean="0"/>
-              <a:t>12/3/13</a:t>
+              <a:t>12/9/13</a:t>
             </a:fld>
             <a:endParaRPr lang="en-US"/>
           </a:p>
@@ -12951,7 +12952,7 @@
                 <a:latin typeface="Calibri"/>
               </a:rPr>
               <a:pPr defTabSz="86263"/>
-              <a:t>12/3/13</a:t>
+              <a:t>12/9/13</a:t>
             </a:fld>
             <a:endParaRPr lang="en-US">
               <a:solidFill>
@@ -13500,7 +13501,7 @@
                 <a:latin typeface="Calibri"/>
               </a:rPr>
               <a:pPr/>
-              <a:t>12/3/13</a:t>
+              <a:t>12/9/13</a:t>
             </a:fld>
             <a:endParaRPr lang="en-US">
               <a:solidFill>
@@ -14058,7 +14059,7 @@
                 <a:latin typeface="Calibri"/>
               </a:rPr>
               <a:pPr/>
-              <a:t>12/3/13</a:t>
+              <a:t>12/9/13</a:t>
             </a:fld>
             <a:endParaRPr lang="en-US">
               <a:solidFill>
@@ -14615,6 +14616,124 @@
     <p:extLst>
       <p:ext uri="{BB962C8B-B14F-4D97-AF65-F5344CB8AC3E}">
         <p14:creationId xmlns:p14="http://schemas.microsoft.com/office/powerpoint/2010/main" val="4117673707"/>
+      </p:ext>
+    </p:extLst>
+  </p:cSld>
+  <p:clrMapOvr>
+    <a:masterClrMapping/>
+  </p:clrMapOvr>
+  <p:transition xmlns:p14="http://schemas.microsoft.com/office/powerpoint/2010/main">
+    <p:fade/>
+  </p:transition>
+  <p:timing>
+    <p:tnLst>
+      <p:par>
+        <p:cTn xmlns:p14="http://schemas.microsoft.com/office/powerpoint/2010/main" id="1" dur="indefinite" restart="never" nodeType="tmRoot"/>
+      </p:par>
+    </p:tnLst>
+  </p:timing>
+</p:sld>
+</file>
+
+<file path=ppt/slides/slide10.xml><?xml version="1.0" encoding="utf-8"?>
+<p:sld xmlns:a="http://schemas.openxmlformats.org/drawingml/2006/main" xmlns:r="http://schemas.openxmlformats.org/officeDocument/2006/relationships" xmlns:p="http://schemas.openxmlformats.org/presentationml/2006/main">
+  <p:cSld>
+    <p:spTree>
+      <p:nvGrpSpPr>
+        <p:cNvPr id="1" name=""/>
+        <p:cNvGrpSpPr/>
+        <p:nvPr/>
+      </p:nvGrpSpPr>
+      <p:grpSpPr>
+        <a:xfrm>
+          <a:off x="0" y="0"/>
+          <a:ext cx="0" cy="0"/>
+          <a:chOff x="0" y="0"/>
+          <a:chExt cx="0" cy="0"/>
+        </a:xfrm>
+      </p:grpSpPr>
+      <p:sp>
+        <p:nvSpPr>
+          <p:cNvPr id="11" name="Rectangle 10"/>
+          <p:cNvSpPr/>
+          <p:nvPr/>
+        </p:nvSpPr>
+        <p:spPr>
+          <a:xfrm>
+            <a:off x="0" y="0"/>
+            <a:ext cx="1938338" cy="1087438"/>
+          </a:xfrm>
+          <a:prstGeom prst="rect">
+            <a:avLst/>
+          </a:prstGeom>
+          <a:noFill/>
+          <a:ln w="12700" cmpd="sng">
+            <a:solidFill>
+              <a:schemeClr val="tx1">
+                <a:lumMod val="65000"/>
+                <a:lumOff val="35000"/>
+              </a:schemeClr>
+            </a:solidFill>
+          </a:ln>
+          <a:effectLst/>
+        </p:spPr>
+        <p:style>
+          <a:lnRef idx="1">
+            <a:schemeClr val="accent1"/>
+          </a:lnRef>
+          <a:fillRef idx="3">
+            <a:schemeClr val="accent1"/>
+          </a:fillRef>
+          <a:effectRef idx="2">
+            <a:schemeClr val="accent1"/>
+          </a:effectRef>
+          <a:fontRef idx="minor">
+            <a:schemeClr val="lt1"/>
+          </a:fontRef>
+        </p:style>
+        <p:txBody>
+          <a:bodyPr lIns="19330" tIns="9663" rIns="19330" bIns="9663" rtlCol="0" anchor="ctr"/>
+          <a:lstStyle/>
+          <a:p>
+            <a:pPr algn="ctr"/>
+            <a:endParaRPr lang="en-US"/>
+          </a:p>
+        </p:txBody>
+      </p:sp>
+      <p:pic>
+        <p:nvPicPr>
+          <p:cNvPr id="4" name="Picture 3" descr="Screen Shot 2013-12-09 at 4.01.27 PM.png"/>
+          <p:cNvPicPr>
+            <a:picLocks noChangeAspect="1"/>
+          </p:cNvPicPr>
+          <p:nvPr/>
+        </p:nvPicPr>
+        <p:blipFill>
+          <a:blip r:embed="rId2">
+            <a:extLst>
+              <a:ext uri="{28A0092B-C50C-407E-A947-70E740481C1C}">
+                <a14:useLocalDpi xmlns:a14="http://schemas.microsoft.com/office/drawing/2010/main" val="0"/>
+              </a:ext>
+            </a:extLst>
+          </a:blip>
+          <a:stretch>
+            <a:fillRect/>
+          </a:stretch>
+        </p:blipFill>
+        <p:spPr>
+          <a:xfrm>
+            <a:off x="169863" y="324812"/>
+            <a:ext cx="1604962" cy="437250"/>
+          </a:xfrm>
+          <a:prstGeom prst="rect">
+            <a:avLst/>
+          </a:prstGeom>
+        </p:spPr>
+      </p:pic>
+    </p:spTree>
+    <p:extLst>
+      <p:ext uri="{BB962C8B-B14F-4D97-AF65-F5344CB8AC3E}">
+        <p14:creationId xmlns:p14="http://schemas.microsoft.com/office/powerpoint/2010/main" val="2080795011"/>
       </p:ext>
     </p:extLst>
   </p:cSld>

</xml_diff>